<commit_message>
update lab 6 and lecture notes
</commit_message>
<xml_diff>
--- a/lectures/lec9/Lec9a-Superhet-DirectConv.pptx
+++ b/lectures/lec9/Lec9a-Superhet-DirectConv.pptx
@@ -323,7 +323,7 @@
             <a:fld id="{F33530C9-BF13-40EE-A1EC-EBBB0134EBBA}" type="datetime1">
               <a:rPr lang="en-US"/>
               <a:pPr/>
-              <a:t>11/19/2015</a:t>
+              <a:t>11/20/2015</a:t>
             </a:fld>
             <a:endParaRPr lang="en-US"/>
           </a:p>
@@ -541,7 +541,7 @@
             <a:fld id="{7DD20F8F-B3A0-465C-A2C5-4272F8BE0711}" type="datetime1">
               <a:rPr lang="en-US"/>
               <a:pPr/>
-              <a:t>11/19/2015</a:t>
+              <a:t>11/20/2015</a:t>
             </a:fld>
             <a:endParaRPr lang="en-US"/>
           </a:p>
@@ -940,7 +940,7 @@
             <a:fld id="{7DD20F8F-B3A0-465C-A2C5-4272F8BE0711}" type="datetime1">
               <a:rPr lang="en-US" smtClean="0"/>
               <a:pPr/>
-              <a:t>11/19/2015</a:t>
+              <a:t>11/20/2015</a:t>
             </a:fld>
             <a:endParaRPr lang="en-US"/>
           </a:p>
@@ -1077,7 +1077,7 @@
             <a:fld id="{7DD20F8F-B3A0-465C-A2C5-4272F8BE0711}" type="datetime1">
               <a:rPr lang="en-US" smtClean="0"/>
               <a:pPr/>
-              <a:t>11/19/2015</a:t>
+              <a:t>11/20/2015</a:t>
             </a:fld>
             <a:endParaRPr lang="en-US"/>
           </a:p>
@@ -2920,7 +2920,19 @@
             </a:r>
             <a:r>
               <a:rPr lang="en-US" dirty="0" smtClean="0"/>
-              <a:t> Receiver</a:t>
+              <a:t> </a:t>
+            </a:r>
+            <a:r>
+              <a:rPr lang="en-US" dirty="0" smtClean="0"/>
+              <a:t>(</a:t>
+            </a:r>
+            <a:r>
+              <a:rPr lang="en-US" dirty="0" err="1" smtClean="0"/>
+              <a:t>SuperHet</a:t>
+            </a:r>
+            <a:r>
+              <a:rPr lang="en-US" smtClean="0"/>
+              <a:t>) Receiver</a:t>
             </a:r>
             <a:endParaRPr lang="en-US" dirty="0"/>
           </a:p>
@@ -9265,30 +9277,13 @@
             <a:pPr lvl="1"/>
             <a:r>
               <a:rPr lang="en-US" dirty="0" smtClean="0"/>
-              <a:t>Link budget calculation</a:t>
-            </a:r>
-          </a:p>
-          <a:p>
-            <a:pPr lvl="1"/>
+              <a:t>Link budget </a:t>
+            </a:r>
             <a:r>
               <a:rPr lang="en-US" dirty="0" smtClean="0"/>
-              <a:t>Radar systems</a:t>
-            </a:r>
-          </a:p>
-          <a:p>
-            <a:pPr lvl="1"/>
-            <a:r>
-              <a:rPr lang="en-US" dirty="0" smtClean="0"/>
-              <a:t>Wireless communications systems</a:t>
-            </a:r>
-          </a:p>
-          <a:p>
-            <a:pPr lvl="1"/>
-            <a:r>
-              <a:rPr lang="en-US" dirty="0" smtClean="0"/>
-              <a:t>Test and measurement instrument</a:t>
-            </a:r>
-            <a:endParaRPr lang="en-US" dirty="0"/>
+              <a:t>calculation</a:t>
+            </a:r>
+            <a:endParaRPr lang="en-US" dirty="0" smtClean="0"/>
           </a:p>
         </p:txBody>
       </p:sp>

</xml_diff>